<commit_message>
/ ‘dns/dns1-exercise.txt’ / ‘dns/dns1-presentation.pptx’ / ‘dns/dns2-exercise2.txt’ / ‘dns/dns2-exercise3.txt’ / ‘dns/dns3-exercise.txt’
</commit_message>
<xml_diff>
--- a/dns/dns1-presentation.pptx
+++ b/dns/dns1-presentation.pptx
@@ -141,6 +141,11 @@
       </a:defRPr>
     </a:lvl9pPr>
   </p:defaultTextStyle>
+  <p:extLst>
+    <p:ext uri="{EFAFB233-063F-42B5-8137-9DF3F51BA10A}">
+      <p15:sldGuideLst xmlns:p15="http://schemas.microsoft.com/office/powerpoint/2012/main"/>
+    </p:ext>
+  </p:extLst>
 </p:presentation>
 </file>
 
@@ -1958,8 +1963,40 @@
               <a:defRPr sz="1800"/>
             </a:pPr>
             <a:r>
-              <a:rPr sz="2890"/>
-              <a:t>Commonly seen Resource Records (RRs)</a:t>
+              <a:rPr sz="2890" dirty="0"/>
+              <a:t>Commonly seen Resource </a:t>
+            </a:r>
+            <a:r>
+              <a:rPr sz="2890" dirty="0" smtClean="0"/>
+              <a:t>Record</a:t>
+            </a:r>
+            <a:r>
+              <a:rPr lang="en-US" sz="2890" dirty="0" smtClean="0"/>
+              <a:t> Type</a:t>
+            </a:r>
+            <a:r>
+              <a:rPr sz="2890" dirty="0" smtClean="0"/>
+              <a:t>s </a:t>
+            </a:r>
+            <a:r>
+              <a:rPr sz="2890" dirty="0"/>
+              <a:t>(</a:t>
+            </a:r>
+            <a:r>
+              <a:rPr sz="2890" dirty="0" smtClean="0"/>
+              <a:t>RR</a:t>
+            </a:r>
+            <a:r>
+              <a:rPr lang="en-US" sz="2890" dirty="0" smtClean="0"/>
+              <a:t>TYPE</a:t>
+            </a:r>
+            <a:r>
+              <a:rPr sz="2890" dirty="0" smtClean="0"/>
+              <a:t>s</a:t>
+            </a:r>
+            <a:r>
+              <a:rPr sz="2890" dirty="0"/>
+              <a:t>)</a:t>
             </a:r>
           </a:p>
         </p:txBody>
@@ -2030,7 +2067,7 @@
               <a:defRPr sz="1800"/>
             </a:pPr>
             <a:r>
-              <a:rPr sz="2600"/>
+              <a:rPr sz="2600" dirty="0"/>
               <a:t>A (address): map hostname to IPv4 address</a:t>
             </a:r>
           </a:p>
@@ -2068,7 +2105,7 @@
               <a:defRPr sz="1800"/>
             </a:pPr>
             <a:r>
-              <a:rPr sz="2600"/>
+              <a:rPr sz="2600" dirty="0"/>
               <a:t>AAAA (quad A): map a hostname to IPv6 address</a:t>
             </a:r>
           </a:p>
@@ -2106,7 +2143,7 @@
               <a:defRPr sz="1800"/>
             </a:pPr>
             <a:r>
-              <a:rPr sz="2600"/>
+              <a:rPr sz="2600" dirty="0"/>
               <a:t>PTR (pointer): map IP address to hostname</a:t>
             </a:r>
           </a:p>
@@ -2144,9 +2181,14 @@
               <a:defRPr sz="1800"/>
             </a:pPr>
             <a:r>
-              <a:rPr sz="2600"/>
-              <a:t>MX (mail exchanger): where to deliver mail for user@domain</a:t>
-            </a:r>
+              <a:rPr sz="2600" dirty="0"/>
+              <a:t>MX (mail exchanger): where to deliver mail for </a:t>
+            </a:r>
+            <a:r>
+              <a:rPr lang="en-US" sz="2600" dirty="0" smtClean="0"/>
+              <a:t>a mail domain</a:t>
+            </a:r>
+            <a:endParaRPr sz="2600" dirty="0"/>
           </a:p>
           <a:p>
             <a:pPr marL="297769" lvl="0" indent="-297769">
@@ -2182,7 +2224,7 @@
               <a:defRPr sz="1800"/>
             </a:pPr>
             <a:r>
-              <a:rPr sz="2600"/>
+              <a:rPr sz="2600" dirty="0"/>
               <a:t>CNAME (canonical name): map alternative hostname to real hostname</a:t>
             </a:r>
           </a:p>
@@ -2220,7 +2262,7 @@
               <a:defRPr sz="1800"/>
             </a:pPr>
             <a:r>
-              <a:rPr sz="2600"/>
+              <a:rPr sz="2600" dirty="0"/>
               <a:t>TXT (text): any descriptive text</a:t>
             </a:r>
           </a:p>
@@ -2258,7 +2300,7 @@
               <a:defRPr sz="1800"/>
             </a:pPr>
             <a:r>
-              <a:rPr sz="2600"/>
+              <a:rPr sz="2600" dirty="0"/>
               <a:t>NS (name server), SOA (start of authority): used for delegation and management of the DNS itself</a:t>
             </a:r>
           </a:p>
@@ -2438,11 +2480,11 @@
               <a:defRPr sz="1800"/>
             </a:pPr>
             <a:r>
-              <a:rPr sz="2800"/>
+              <a:rPr sz="2800" dirty="0"/>
               <a:t>Query: 			</a:t>
             </a:r>
             <a:r>
-              <a:rPr sz="2800" b="1">
+              <a:rPr sz="2800" b="1" dirty="0">
                 <a:solidFill>
                   <a:srgbClr val="4700B8"/>
                 </a:solidFill>
@@ -2499,11 +2541,11 @@
               <a:defRPr sz="1800"/>
             </a:pPr>
             <a:r>
-              <a:rPr sz="2800"/>
+              <a:rPr sz="2800" dirty="0"/>
               <a:t>Query type: </a:t>
             </a:r>
             <a:r>
-              <a:rPr sz="2800">
+              <a:rPr sz="2800" dirty="0">
                 <a:solidFill>
                   <a:srgbClr val="4700B8"/>
                 </a:solidFill>
@@ -2511,7 +2553,7 @@
               <a:t>	</a:t>
             </a:r>
             <a:r>
-              <a:rPr sz="2800" b="1">
+              <a:rPr sz="2800" b="1" dirty="0">
                 <a:solidFill>
                   <a:srgbClr val="4700B8"/>
                 </a:solidFill>
@@ -2568,7 +2610,7 @@
               <a:defRPr sz="1800"/>
             </a:pPr>
             <a:r>
-              <a:rPr sz="2800"/>
+              <a:rPr sz="2800" dirty="0"/>
               <a:t>Result:</a:t>
             </a:r>
           </a:p>
@@ -2617,7 +2659,7 @@
               </a:tabLst>
               <a:defRPr sz="1800"/>
             </a:pPr>
-            <a:endParaRPr sz="2200" b="1" i="1">
+            <a:endParaRPr sz="2200" b="1" i="1" dirty="0">
               <a:solidFill>
                 <a:srgbClr val="4700B8"/>
               </a:solidFill>
@@ -2673,7 +2715,7 @@
               <a:defRPr sz="1800"/>
             </a:pPr>
             <a:r>
-              <a:rPr sz="2200" b="1" i="1">
+              <a:rPr sz="2200" b="1" i="1" dirty="0">
                 <a:solidFill>
                   <a:srgbClr val="4700B8"/>
                 </a:solidFill>
@@ -2730,7 +2772,7 @@
               </a:tabLst>
               <a:defRPr sz="1800"/>
             </a:pPr>
-            <a:endParaRPr sz="2200" b="1" i="1">
+            <a:endParaRPr sz="2200" b="1" i="1" dirty="0">
               <a:solidFill>
                 <a:srgbClr val="FF0000"/>
               </a:solidFill>
@@ -2785,12 +2827,32 @@
               <a:defRPr sz="1800"/>
             </a:pPr>
             <a:r>
-              <a:rPr sz="2600"/>
-              <a:t>In this case a single RR is found, </a:t>
-            </a:r>
-            <a:r>
-              <a:rPr sz="2800"/>
-              <a:t>but in general, multiple RRs may be returned.</a:t>
+              <a:rPr sz="2600" dirty="0"/>
+              <a:t>In this case a single </a:t>
+            </a:r>
+            <a:r>
+              <a:rPr sz="2600" dirty="0" smtClean="0"/>
+              <a:t>RR </a:t>
+            </a:r>
+            <a:r>
+              <a:rPr sz="2600" dirty="0"/>
+              <a:t>is found, </a:t>
+            </a:r>
+            <a:r>
+              <a:rPr sz="2800" dirty="0"/>
+              <a:t>but </a:t>
+            </a:r>
+            <a:r>
+              <a:rPr lang="en-US" sz="2800" dirty="0" smtClean="0"/>
+              <a:t>a set of</a:t>
+            </a:r>
+            <a:r>
+              <a:rPr sz="2800" dirty="0" smtClean="0"/>
+              <a:t> </a:t>
+            </a:r>
+            <a:r>
+              <a:rPr sz="2800" dirty="0"/>
+              <a:t>multiple RRs may be returned.</a:t>
             </a:r>
           </a:p>
           <a:p>
@@ -2837,7 +2899,7 @@
               <a:defRPr sz="1800"/>
             </a:pPr>
             <a:r>
-              <a:rPr sz="2600"/>
+              <a:rPr sz="2600" dirty="0"/>
               <a:t>(IN is the "class" for INTERNET use of the DNS)</a:t>
             </a:r>
           </a:p>
@@ -3006,7 +3068,7 @@
               <a:defRPr sz="1800"/>
             </a:pPr>
             <a:r>
-              <a:rPr sz="2800"/>
+              <a:rPr sz="2800" dirty="0"/>
               <a:t>POSITIVE (“NOERROR”)</a:t>
             </a:r>
           </a:p>
@@ -3043,14 +3105,46 @@
               <a:defRPr sz="1800"/>
             </a:pPr>
             <a:r>
-              <a:rPr sz="2800">
+              <a:rPr sz="2800" dirty="0">
                 <a:solidFill>
                   <a:srgbClr val="2300DC"/>
                 </a:solidFill>
               </a:rPr>
-              <a:t>the name exists, and has zero or more RRs associated with it</a:t>
-            </a:r>
-            <a:endParaRPr sz="2400">
+              <a:t>the name exists, and has zero or more </a:t>
+            </a:r>
+            <a:r>
+              <a:rPr sz="2800" dirty="0" smtClean="0">
+                <a:solidFill>
+                  <a:srgbClr val="2300DC"/>
+                </a:solidFill>
+              </a:rPr>
+              <a:t>RR</a:t>
+            </a:r>
+            <a:r>
+              <a:rPr lang="en-US" sz="2800" dirty="0" smtClean="0">
+                <a:solidFill>
+                  <a:srgbClr val="2300DC"/>
+                </a:solidFill>
+              </a:rPr>
+              <a:t>Set</a:t>
+            </a:r>
+            <a:r>
+              <a:rPr sz="2800" dirty="0" smtClean="0">
+                <a:solidFill>
+                  <a:srgbClr val="2300DC"/>
+                </a:solidFill>
+              </a:rPr>
+              <a:t>s </a:t>
+            </a:r>
+            <a:r>
+              <a:rPr sz="2800" dirty="0">
+                <a:solidFill>
+                  <a:srgbClr val="2300DC"/>
+                </a:solidFill>
+              </a:rPr>
+              <a:t>associated with it</a:t>
+            </a:r>
+            <a:endParaRPr sz="2400" dirty="0">
               <a:solidFill>
                 <a:srgbClr val="2300DC"/>
               </a:solidFill>
@@ -3090,7 +3184,7 @@
               <a:defRPr sz="1800"/>
             </a:pPr>
             <a:r>
-              <a:rPr sz="2800"/>
+              <a:rPr sz="2800" dirty="0"/>
               <a:t>NEGATIVE (“NXDOMAIN”)</a:t>
             </a:r>
           </a:p>
@@ -3127,14 +3221,14 @@
               <a:defRPr sz="1800"/>
             </a:pPr>
             <a:r>
-              <a:rPr sz="2800">
+              <a:rPr sz="2800" dirty="0">
                 <a:solidFill>
                   <a:srgbClr val="2300DC"/>
                 </a:solidFill>
               </a:rPr>
               <a:t>the name does not exist</a:t>
             </a:r>
-            <a:endParaRPr sz="2400">
+            <a:endParaRPr sz="2400" dirty="0">
               <a:solidFill>
                 <a:srgbClr val="2300DC"/>
               </a:solidFill>
@@ -3171,7 +3265,7 @@
               <a:defRPr sz="1800"/>
             </a:pPr>
             <a:r>
-              <a:rPr sz="2800"/>
+              <a:rPr sz="2800" dirty="0"/>
               <a:t>SERVER FAILURE (“SERVFAIL”)</a:t>
             </a:r>
           </a:p>
@@ -3208,14 +3302,14 @@
               <a:defRPr sz="1800"/>
             </a:pPr>
             <a:r>
-              <a:rPr sz="2800">
+              <a:rPr sz="2800" dirty="0">
                 <a:solidFill>
                   <a:srgbClr val="2300DC"/>
                 </a:solidFill>
               </a:rPr>
               <a:t>server is having bad hair day</a:t>
             </a:r>
-            <a:endParaRPr sz="3200">
+            <a:endParaRPr sz="3200" dirty="0">
               <a:solidFill>
                 <a:srgbClr val="2300DC"/>
               </a:solidFill>
@@ -3255,7 +3349,7 @@
               <a:defRPr sz="1800"/>
             </a:pPr>
             <a:r>
-              <a:rPr sz="2800"/>
+              <a:rPr sz="2800" dirty="0"/>
               <a:t>FORMAT ERROR (“FORMERR”)</a:t>
             </a:r>
           </a:p>
@@ -3292,14 +3386,14 @@
               <a:defRPr sz="1800"/>
             </a:pPr>
             <a:r>
-              <a:rPr sz="2400">
+              <a:rPr sz="2400" dirty="0">
                 <a:solidFill>
                   <a:srgbClr val="2300DC"/>
                 </a:solidFill>
               </a:rPr>
               <a:t>the query you sent was broken in some way</a:t>
             </a:r>
-            <a:endParaRPr sz="2400"/>
+            <a:endParaRPr sz="2400" dirty="0"/>
           </a:p>
           <a:p>
             <a:pPr lvl="0">
@@ -3335,7 +3429,7 @@
               <a:defRPr sz="1800"/>
             </a:pPr>
             <a:r>
-              <a:rPr sz="2800"/>
+              <a:rPr sz="2800" dirty="0"/>
               <a:t>REFUSED (“REFUSED”)</a:t>
             </a:r>
           </a:p>
@@ -3372,12 +3466,28 @@
               <a:defRPr sz="1800"/>
             </a:pPr>
             <a:r>
-              <a:rPr sz="2800">
+              <a:rPr lang="en-US" sz="2800" dirty="0" smtClean="0">
                 <a:solidFill>
                   <a:srgbClr val="2300DC"/>
                 </a:solidFill>
               </a:rPr>
-              <a:t>not allowed to query the server</a:t>
+              <a:t>You are </a:t>
+            </a:r>
+            <a:r>
+              <a:rPr sz="2800" dirty="0" smtClean="0">
+                <a:solidFill>
+                  <a:srgbClr val="2300DC"/>
+                </a:solidFill>
+              </a:rPr>
+              <a:t>not </a:t>
+            </a:r>
+            <a:r>
+              <a:rPr sz="2800" dirty="0">
+                <a:solidFill>
+                  <a:srgbClr val="2300DC"/>
+                </a:solidFill>
+              </a:rPr>
+              <a:t>allowed to query the server</a:t>
             </a:r>
           </a:p>
         </p:txBody>
@@ -4227,7 +4337,7 @@
               <a:defRPr sz="1800"/>
             </a:pPr>
             <a:r>
-              <a:rPr sz="2800"/>
+              <a:rPr sz="2800" dirty="0"/>
               <a:t>(Of course - it runs across a network)</a:t>
             </a:r>
           </a:p>
@@ -4265,7 +4375,7 @@
               <a:defRPr sz="1800"/>
             </a:pPr>
             <a:r>
-              <a:rPr sz="2800"/>
+              <a:rPr sz="2800" dirty="0"/>
               <a:t>Requests and responses are most frequently carried in UDP packets, port 53</a:t>
             </a:r>
           </a:p>
@@ -4303,7 +4413,7 @@
               <a:defRPr sz="1800"/>
             </a:pPr>
             <a:r>
-              <a:rPr sz="2800"/>
+              <a:rPr sz="2800" dirty="0"/>
               <a:t>DNS can also use TCP transport, port 53</a:t>
             </a:r>
           </a:p>
@@ -4340,9 +4450,18 @@
               <a:defRPr sz="1800"/>
             </a:pPr>
             <a:r>
-              <a:rPr sz="2400"/>
-              <a:t>for very large responses e.g. zone transfers</a:t>
-            </a:r>
+              <a:rPr sz="2400" dirty="0"/>
+              <a:t>for </a:t>
+            </a:r>
+            <a:r>
+              <a:rPr sz="2400" dirty="0" smtClean="0"/>
+              <a:t>large responses</a:t>
+            </a:r>
+            <a:r>
+              <a:rPr lang="en-US" sz="2400" dirty="0" smtClean="0"/>
+              <a:t> (not just zone transfers)</a:t>
+            </a:r>
+            <a:endParaRPr sz="2400" dirty="0"/>
           </a:p>
           <a:p>
             <a:pPr marL="720725" lvl="1" indent="-263525">
@@ -4377,7 +4496,7 @@
               <a:defRPr sz="1800"/>
             </a:pPr>
             <a:r>
-              <a:rPr sz="2400"/>
+              <a:rPr sz="2400" dirty="0"/>
               <a:t>because you want to exchange more than one query/response on a single session</a:t>
             </a:r>
           </a:p>
@@ -4414,7 +4533,7 @@
               <a:defRPr sz="1800"/>
             </a:pPr>
             <a:r>
-              <a:rPr sz="2400"/>
+              <a:rPr sz="2400" dirty="0"/>
               <a:t>because a response you received told you to with TC=1</a:t>
             </a:r>
           </a:p>
@@ -4451,7 +4570,7 @@
               <a:defRPr sz="1800"/>
             </a:pPr>
             <a:r>
-              <a:rPr sz="2400"/>
+              <a:rPr sz="2400" dirty="0"/>
               <a:t>because UDP is being aggressively rate-limited or blocked (e.g. to mitigate a reflection attack)</a:t>
             </a:r>
           </a:p>
@@ -6839,7 +6958,7 @@
               <a:defRPr sz="1800"/>
             </a:pPr>
             <a:r>
-              <a:rPr sz="2800"/>
+              <a:rPr sz="2800" dirty="0"/>
               <a:t>It has to be explicitly configured (statically, or via DHCP etc)</a:t>
             </a:r>
           </a:p>
@@ -6877,7 +6996,7 @@
               </a:tabLst>
               <a:defRPr sz="1800"/>
             </a:pPr>
-            <a:endParaRPr sz="2800"/>
+            <a:endParaRPr sz="2800" dirty="0"/>
           </a:p>
           <a:p>
             <a:pPr lvl="0">
@@ -6913,8 +7032,20 @@
               <a:defRPr sz="1800"/>
             </a:pPr>
             <a:r>
-              <a:rPr sz="2800"/>
-              <a:t>Must be configured with the IP ADDRESS of a cache (why not name?)</a:t>
+              <a:rPr sz="2800" dirty="0"/>
+              <a:t>Must be configured with the IP ADDRESS of a cache (why not </a:t>
+            </a:r>
+            <a:r>
+              <a:rPr lang="en-US" sz="2800" dirty="0" smtClean="0"/>
+              <a:t>its </a:t>
+            </a:r>
+            <a:r>
+              <a:rPr sz="2800" dirty="0" smtClean="0"/>
+              <a:t>name</a:t>
+            </a:r>
+            <a:r>
+              <a:rPr sz="2800" dirty="0"/>
+              <a:t>?)</a:t>
             </a:r>
           </a:p>
           <a:p>
@@ -6951,7 +7082,7 @@
               </a:tabLst>
               <a:defRPr sz="1800"/>
             </a:pPr>
-            <a:endParaRPr sz="2800"/>
+            <a:endParaRPr sz="2800" dirty="0"/>
           </a:p>
           <a:p>
             <a:pPr lvl="0">
@@ -6987,9 +7118,65 @@
               <a:defRPr sz="1800"/>
             </a:pPr>
             <a:r>
-              <a:rPr sz="2800"/>
-              <a:t>Good idea to configure more than one cache, in case the first one fails</a:t>
-            </a:r>
+              <a:rPr sz="2800" dirty="0"/>
+              <a:t>Good idea to configure more than one </a:t>
+            </a:r>
+            <a:r>
+              <a:rPr lang="en-US" sz="2800" dirty="0" smtClean="0"/>
+              <a:t>recursive nameserver</a:t>
+            </a:r>
+            <a:r>
+              <a:rPr sz="2800" dirty="0" smtClean="0"/>
+              <a:t>, </a:t>
+            </a:r>
+            <a:r>
+              <a:rPr sz="2800" dirty="0"/>
+              <a:t>in case the first one </a:t>
+            </a:r>
+            <a:r>
+              <a:rPr sz="2800" dirty="0" smtClean="0"/>
+              <a:t>fails</a:t>
+            </a:r>
+            <a:endParaRPr lang="en-US" sz="2800" dirty="0" smtClean="0"/>
+          </a:p>
+          <a:p>
+            <a:pPr lvl="1">
+              <a:lnSpc>
+                <a:spcPct val="101000"/>
+              </a:lnSpc>
+              <a:spcBef>
+                <a:spcPts val="300"/>
+              </a:spcBef>
+              <a:buChar char="•"/>
+              <a:tabLst>
+                <a:tab pos="444500" algn="l"/>
+                <a:tab pos="901700" algn="l"/>
+                <a:tab pos="1358900" algn="l"/>
+                <a:tab pos="1816100" algn="l"/>
+                <a:tab pos="2273300" algn="l"/>
+                <a:tab pos="2730500" algn="l"/>
+                <a:tab pos="3187700" algn="l"/>
+                <a:tab pos="3644900" algn="l"/>
+                <a:tab pos="4102100" algn="l"/>
+                <a:tab pos="4559300" algn="l"/>
+                <a:tab pos="5016500" algn="l"/>
+                <a:tab pos="5473700" algn="l"/>
+                <a:tab pos="5930900" algn="l"/>
+                <a:tab pos="6388100" algn="l"/>
+                <a:tab pos="6845300" algn="l"/>
+                <a:tab pos="7302500" algn="l"/>
+                <a:tab pos="7759700" algn="l"/>
+                <a:tab pos="8216900" algn="l"/>
+                <a:tab pos="8674100" algn="l"/>
+                <a:tab pos="9131300" algn="l"/>
+              </a:tabLst>
+              <a:defRPr sz="1800"/>
+            </a:pPr>
+            <a:r>
+              <a:rPr lang="en-US" dirty="0" smtClean="0"/>
+              <a:t>But failover between them might not be quick</a:t>
+            </a:r>
+            <a:endParaRPr dirty="0"/>
           </a:p>
         </p:txBody>
       </p:sp>
@@ -7157,7 +7344,7 @@
               <a:defRPr sz="1800"/>
             </a:pPr>
             <a:r>
-              <a:rPr sz="2800"/>
+              <a:rPr sz="2800" dirty="0"/>
               <a:t>Must have PERMISSION to use it</a:t>
             </a:r>
           </a:p>
@@ -7194,8 +7381,32 @@
               <a:defRPr sz="1800"/>
             </a:pPr>
             <a:r>
-              <a:rPr sz="2400"/>
-              <a:t>e.g. cache at your ISP, or your own, or a reliably public one</a:t>
+              <a:rPr sz="2400" dirty="0"/>
+              <a:t>e.g. </a:t>
+            </a:r>
+            <a:r>
+              <a:rPr lang="en-US" sz="2400" dirty="0" smtClean="0"/>
+              <a:t>recursive resolver </a:t>
+            </a:r>
+            <a:r>
+              <a:rPr sz="2400" dirty="0" smtClean="0"/>
+              <a:t>at </a:t>
+            </a:r>
+            <a:r>
+              <a:rPr sz="2400" dirty="0"/>
+              <a:t>your ISP, or your own, or a </a:t>
+            </a:r>
+            <a:r>
+              <a:rPr lang="en-US" sz="2400" dirty="0" smtClean="0"/>
+              <a:t>deliberately-</a:t>
+            </a:r>
+            <a:r>
+              <a:rPr sz="2400" dirty="0" smtClean="0"/>
+              <a:t>public </a:t>
+            </a:r>
+            <a:r>
+              <a:rPr sz="2400" dirty="0"/>
+              <a:t>one</a:t>
             </a:r>
           </a:p>
           <a:p>
@@ -7232,9 +7443,14 @@
               <a:defRPr sz="1800"/>
             </a:pPr>
             <a:r>
-              <a:rPr sz="2800"/>
-              <a:t>Prefer a nearby cache</a:t>
-            </a:r>
+              <a:rPr sz="2800" dirty="0"/>
+              <a:t>Prefer a nearby </a:t>
+            </a:r>
+            <a:r>
+              <a:rPr lang="en-US" sz="2800" dirty="0" smtClean="0"/>
+              <a:t>recursive resolver</a:t>
+            </a:r>
+            <a:endParaRPr sz="2800" dirty="0"/>
           </a:p>
           <a:p>
             <a:pPr marL="720725" lvl="1" indent="-263525">
@@ -7269,7 +7485,7 @@
               <a:defRPr sz="1800"/>
             </a:pPr>
             <a:r>
-              <a:rPr sz="2400"/>
+              <a:rPr sz="2400" dirty="0"/>
               <a:t>Minimises round-trip time and packet loss</a:t>
             </a:r>
           </a:p>
@@ -7306,9 +7522,14 @@
               <a:defRPr sz="1800"/>
             </a:pPr>
             <a:r>
-              <a:rPr sz="2400"/>
-              <a:t>Can reduce traffic on your external link, since often the cache can answer without contacting other servers</a:t>
-            </a:r>
+              <a:rPr sz="2400" dirty="0"/>
+              <a:t>Can reduce traffic on your external link, since often the cache can answer without contacting other </a:t>
+            </a:r>
+            <a:r>
+              <a:rPr sz="2400" dirty="0" smtClean="0"/>
+              <a:t>servers</a:t>
+            </a:r>
+            <a:endParaRPr lang="en-US" dirty="0" smtClean="0"/>
           </a:p>
           <a:p>
             <a:pPr lvl="0">
@@ -7344,9 +7565,18 @@
               <a:defRPr sz="1800"/>
             </a:pPr>
             <a:r>
-              <a:rPr sz="2800"/>
-              <a:t>Prefer a reliable cache</a:t>
-            </a:r>
+              <a:rPr sz="2800" dirty="0" smtClean="0"/>
+              <a:t>Prefer </a:t>
+            </a:r>
+            <a:r>
+              <a:rPr sz="2800" dirty="0"/>
+              <a:t>a reliable </a:t>
+            </a:r>
+            <a:r>
+              <a:rPr lang="en-US" sz="2800" dirty="0" smtClean="0"/>
+              <a:t>recursive resolver</a:t>
+            </a:r>
+            <a:endParaRPr sz="2800" dirty="0"/>
           </a:p>
           <a:p>
             <a:pPr marL="720725" lvl="1" indent="-263525">
@@ -7381,7 +7611,7 @@
               <a:defRPr sz="1800"/>
             </a:pPr>
             <a:r>
-              <a:rPr sz="2400"/>
+              <a:rPr sz="2400" dirty="0"/>
               <a:t>Perhaps your own?</a:t>
             </a:r>
           </a:p>
@@ -7479,8 +7709,20 @@
               <a:defRPr sz="1800"/>
             </a:pPr>
             <a:r>
-              <a:rPr sz="3230"/>
-              <a:t>Stub resolvers can be configured with default domain(s)</a:t>
+              <a:rPr sz="3230" dirty="0"/>
+              <a:t>Stub resolvers can be configured with </a:t>
+            </a:r>
+            <a:r>
+              <a:rPr lang="en-US" sz="3230" dirty="0" smtClean="0"/>
+              <a:t>search </a:t>
+            </a:r>
+            <a:r>
+              <a:rPr sz="3230" dirty="0" smtClean="0"/>
+              <a:t>domain(s</a:t>
+            </a:r>
+            <a:r>
+              <a:rPr sz="3230" dirty="0"/>
+              <a:t>)</a:t>
             </a:r>
           </a:p>
         </p:txBody>
@@ -9284,7 +9526,7 @@
               <a:defRPr sz="1800"/>
             </a:pPr>
             <a:r>
-              <a:rPr sz="1500" b="1">
+              <a:rPr sz="1500" b="1" dirty="0">
                 <a:latin typeface="Courier New"/>
                 <a:ea typeface="Courier New"/>
                 <a:cs typeface="Courier New"/>
@@ -9313,7 +9555,7 @@
               </a:tabLst>
               <a:defRPr sz="1800"/>
             </a:pPr>
-            <a:endParaRPr sz="1500" b="1">
+            <a:endParaRPr sz="1500" b="1" dirty="0">
               <a:latin typeface="Courier New"/>
               <a:ea typeface="Courier New"/>
               <a:cs typeface="Courier New"/>
@@ -9341,7 +9583,7 @@
               <a:defRPr sz="1800"/>
             </a:pPr>
             <a:r>
-              <a:rPr sz="1500" b="1">
+              <a:rPr sz="1500" b="1" dirty="0">
                 <a:latin typeface="Courier New"/>
                 <a:ea typeface="Courier New"/>
                 <a:cs typeface="Courier New"/>
@@ -9371,7 +9613,7 @@
               <a:defRPr sz="1800"/>
             </a:pPr>
             <a:r>
-              <a:rPr sz="1500" b="1">
+              <a:rPr sz="1500" b="1" dirty="0">
                 <a:latin typeface="Courier New"/>
                 <a:ea typeface="Courier New"/>
                 <a:cs typeface="Courier New"/>
@@ -9401,7 +9643,7 @@
               <a:defRPr sz="1800"/>
             </a:pPr>
             <a:r>
-              <a:rPr sz="1500" b="1">
+              <a:rPr sz="1500" b="1" dirty="0">
                 <a:latin typeface="Courier New"/>
                 <a:ea typeface="Courier New"/>
                 <a:cs typeface="Courier New"/>
@@ -9431,7 +9673,7 @@
               <a:defRPr sz="1800"/>
             </a:pPr>
             <a:r>
-              <a:rPr sz="1500" b="1">
+              <a:rPr sz="1500" b="1" dirty="0">
                 <a:latin typeface="Courier New"/>
                 <a:ea typeface="Courier New"/>
                 <a:cs typeface="Courier New"/>
@@ -9461,7 +9703,7 @@
               <a:defRPr sz="1800"/>
             </a:pPr>
             <a:r>
-              <a:rPr sz="1500" b="1">
+              <a:rPr sz="1500" b="1" dirty="0">
                 <a:latin typeface="Courier New"/>
                 <a:ea typeface="Courier New"/>
                 <a:cs typeface="Courier New"/>
@@ -9491,7 +9733,7 @@
               <a:defRPr sz="1800"/>
             </a:pPr>
             <a:r>
-              <a:rPr sz="1500" b="1">
+              <a:rPr sz="1500" b="1" dirty="0">
                 <a:latin typeface="Courier New"/>
                 <a:ea typeface="Courier New"/>
                 <a:cs typeface="Courier New"/>
@@ -9520,7 +9762,7 @@
               </a:tabLst>
               <a:defRPr sz="1800"/>
             </a:pPr>
-            <a:endParaRPr sz="1500" b="1">
+            <a:endParaRPr sz="1500" b="1" dirty="0">
               <a:latin typeface="Courier New"/>
               <a:ea typeface="Courier New"/>
               <a:cs typeface="Courier New"/>
@@ -9548,7 +9790,7 @@
               <a:defRPr sz="1800"/>
             </a:pPr>
             <a:r>
-              <a:rPr sz="1500" b="1">
+              <a:rPr sz="1500" b="1" dirty="0">
                 <a:latin typeface="Courier New"/>
                 <a:ea typeface="Courier New"/>
                 <a:cs typeface="Courier New"/>
@@ -9578,7 +9820,7 @@
               <a:defRPr sz="1800"/>
             </a:pPr>
             <a:r>
-              <a:rPr sz="1500" b="1">
+              <a:rPr sz="1500" b="1" dirty="0">
                 <a:latin typeface="Courier New"/>
                 <a:ea typeface="Courier New"/>
                 <a:cs typeface="Courier New"/>
@@ -9607,7 +9849,7 @@
               </a:tabLst>
               <a:defRPr sz="1800"/>
             </a:pPr>
-            <a:endParaRPr sz="1500" b="1">
+            <a:endParaRPr sz="1500" b="1" dirty="0">
               <a:latin typeface="Courier New"/>
               <a:ea typeface="Courier New"/>
               <a:cs typeface="Courier New"/>
@@ -9635,7 +9877,7 @@
               <a:defRPr sz="1800"/>
             </a:pPr>
             <a:r>
-              <a:rPr sz="1500" b="1">
+              <a:rPr sz="1500" b="1" dirty="0">
                 <a:latin typeface="Courier New"/>
                 <a:ea typeface="Courier New"/>
                 <a:cs typeface="Courier New"/>
@@ -9665,7 +9907,7 @@
               <a:defRPr sz="1800"/>
             </a:pPr>
             <a:r>
-              <a:rPr sz="1500" b="1">
+              <a:rPr sz="1500" b="1" dirty="0">
                 <a:latin typeface="Courier New"/>
                 <a:ea typeface="Courier New"/>
                 <a:cs typeface="Courier New"/>
@@ -9695,7 +9937,7 @@
               <a:defRPr sz="1800"/>
             </a:pPr>
             <a:r>
-              <a:rPr sz="1500" b="1">
+              <a:rPr sz="1500" b="1" dirty="0">
                 <a:latin typeface="Courier New"/>
                 <a:ea typeface="Courier New"/>
                 <a:cs typeface="Courier New"/>
@@ -9724,7 +9966,7 @@
               </a:tabLst>
               <a:defRPr sz="1800"/>
             </a:pPr>
-            <a:endParaRPr sz="1500" b="1">
+            <a:endParaRPr sz="1500" b="1" dirty="0">
               <a:latin typeface="Courier New"/>
               <a:ea typeface="Courier New"/>
               <a:cs typeface="Courier New"/>
@@ -9752,7 +9994,7 @@
               <a:defRPr sz="1800"/>
             </a:pPr>
             <a:r>
-              <a:rPr sz="1500" b="1">
+              <a:rPr sz="1500" b="1" dirty="0">
                 <a:latin typeface="Courier New"/>
                 <a:ea typeface="Courier New"/>
                 <a:cs typeface="Courier New"/>
@@ -9782,7 +10024,7 @@
               <a:defRPr sz="1800"/>
             </a:pPr>
             <a:r>
-              <a:rPr sz="1500" b="1">
+              <a:rPr sz="1500" b="1" dirty="0">
                 <a:latin typeface="Courier New"/>
                 <a:ea typeface="Courier New"/>
                 <a:cs typeface="Courier New"/>
@@ -9812,7 +10054,7 @@
               <a:defRPr sz="1800"/>
             </a:pPr>
             <a:r>
-              <a:rPr sz="1500" b="1">
+              <a:rPr sz="1500" b="1" dirty="0">
                 <a:latin typeface="Courier New"/>
                 <a:ea typeface="Courier New"/>
                 <a:cs typeface="Courier New"/>
@@ -9842,7 +10084,7 @@
               <a:defRPr sz="1800"/>
             </a:pPr>
             <a:r>
-              <a:rPr sz="1500" b="1">
+              <a:rPr sz="1500" b="1" dirty="0">
                 <a:latin typeface="Courier New"/>
                 <a:ea typeface="Courier New"/>
                 <a:cs typeface="Courier New"/>
@@ -9871,7 +10113,7 @@
               </a:tabLst>
               <a:defRPr sz="1800"/>
             </a:pPr>
-            <a:endParaRPr sz="1500" b="1">
+            <a:endParaRPr sz="1500" b="1" dirty="0">
               <a:latin typeface="Courier New"/>
               <a:ea typeface="Courier New"/>
               <a:cs typeface="Courier New"/>
@@ -9899,7 +10141,7 @@
               <a:defRPr sz="1800"/>
             </a:pPr>
             <a:r>
-              <a:rPr sz="1500" b="1">
+              <a:rPr sz="1500" b="1" dirty="0">
                 <a:latin typeface="Courier New"/>
                 <a:ea typeface="Courier New"/>
                 <a:cs typeface="Courier New"/>
@@ -9929,7 +10171,7 @@
               <a:defRPr sz="1800"/>
             </a:pPr>
             <a:r>
-              <a:rPr sz="1500" b="1">
+              <a:rPr sz="1500" b="1" dirty="0">
                 <a:latin typeface="Courier New"/>
                 <a:ea typeface="Courier New"/>
                 <a:cs typeface="Courier New"/>
@@ -9959,7 +10201,7 @@
               <a:defRPr sz="1800"/>
             </a:pPr>
             <a:r>
-              <a:rPr sz="1500" b="1">
+              <a:rPr sz="1500" b="1" dirty="0">
                 <a:latin typeface="Courier New"/>
                 <a:ea typeface="Courier New"/>
                 <a:cs typeface="Courier New"/>
@@ -9989,7 +10231,7 @@
               <a:defRPr sz="1800"/>
             </a:pPr>
             <a:r>
-              <a:rPr sz="1500" b="1">
+              <a:rPr sz="1500" b="1" dirty="0">
                 <a:latin typeface="Courier New"/>
                 <a:ea typeface="Courier New"/>
                 <a:cs typeface="Courier New"/>
@@ -12934,8 +13176,8 @@
         </p:nvSpPr>
         <p:spPr>
           <a:xfrm>
-            <a:off x="1058608" y="2434089"/>
-            <a:ext cx="452947" cy="398401"/>
+            <a:off x="1071914" y="2434089"/>
+            <a:ext cx="426334" cy="389978"/>
           </a:xfrm>
           <a:prstGeom prst="rect">
             <a:avLst/>
@@ -12979,9 +13221,10 @@
               <a:defRPr sz="1800"/>
             </a:pPr>
             <a:r>
-              <a:rPr sz="2000"/>
-              <a:t>ma</a:t>
-            </a:r>
+              <a:rPr lang="en-US" sz="2000" dirty="0" err="1" smtClean="0"/>
+              <a:t>bw</a:t>
+            </a:r>
+            <a:endParaRPr sz="2000" dirty="0"/>
           </a:p>
         </p:txBody>
       </p:sp>
@@ -13651,8 +13894,8 @@
         </p:nvSpPr>
         <p:spPr>
           <a:xfrm>
-            <a:off x="293235" y="3650114"/>
-            <a:ext cx="780368" cy="398401"/>
+            <a:off x="252244" y="3650114"/>
+            <a:ext cx="862351" cy="389978"/>
           </a:xfrm>
           <a:prstGeom prst="rect">
             <a:avLst/>
@@ -13696,9 +13939,14 @@
               <a:defRPr sz="1800"/>
             </a:pPr>
             <a:r>
-              <a:rPr sz="2000"/>
-              <a:t>ac.ma</a:t>
-            </a:r>
+              <a:rPr lang="en-US" dirty="0" err="1"/>
+              <a:t>o</a:t>
+            </a:r>
+            <a:r>
+              <a:rPr lang="en-US" sz="2000" dirty="0" err="1" smtClean="0"/>
+              <a:t>rg.bw</a:t>
+            </a:r>
+            <a:endParaRPr sz="2000" dirty="0"/>
           </a:p>
         </p:txBody>
       </p:sp>
@@ -13710,8 +13958,8 @@
         </p:nvSpPr>
         <p:spPr>
           <a:xfrm>
-            <a:off x="63370" y="4756601"/>
-            <a:ext cx="1262323" cy="398401"/>
+            <a:off x="0" y="4756601"/>
+            <a:ext cx="1557388" cy="389978"/>
           </a:xfrm>
           <a:prstGeom prst="rect">
             <a:avLst/>
@@ -13726,7 +13974,7 @@
           </a:extLst>
         </p:spPr>
         <p:txBody>
-          <a:bodyPr wrap="none" lIns="46799" tIns="46799" rIns="46799" bIns="46799">
+          <a:bodyPr wrap="square" lIns="46799" tIns="46799" rIns="46799" bIns="46799">
             <a:spAutoFit/>
           </a:bodyPr>
           <a:lstStyle>
@@ -13755,9 +14003,14 @@
               <a:defRPr sz="1800"/>
             </a:pPr>
             <a:r>
-              <a:rPr sz="2000"/>
-              <a:t>emi.ac.ma</a:t>
-            </a:r>
+              <a:rPr lang="en-US" dirty="0" err="1"/>
+              <a:t>b</a:t>
+            </a:r>
+            <a:r>
+              <a:rPr lang="en-US" sz="2000" dirty="0" err="1" smtClean="0"/>
+              <a:t>ocra.org.bw</a:t>
+            </a:r>
+            <a:endParaRPr sz="2000" dirty="0"/>
           </a:p>
         </p:txBody>
       </p:sp>
@@ -14143,7 +14396,7 @@
               <a:defRPr sz="1800"/>
             </a:pPr>
             <a:r>
-              <a:rPr sz="2000"/>
+              <a:rPr sz="2000" dirty="0"/>
               <a:t>ws.afnog.org</a:t>
             </a:r>
           </a:p>
@@ -15560,7 +15813,7 @@
               <a:defRPr sz="1800"/>
             </a:pPr>
             <a:r>
-              <a:rPr sz="2800"/>
+              <a:rPr sz="2800" dirty="0"/>
               <a:t>A Domain Name (like www.ws.afnog.org) is the KEY to look up information</a:t>
             </a:r>
           </a:p>
@@ -15598,8 +15851,60 @@
               <a:defRPr sz="1800"/>
             </a:pPr>
             <a:r>
-              <a:rPr sz="2800"/>
-              <a:t>The result is one or more RESOURCE RECORDS (RRs)</a:t>
+              <a:rPr sz="2800" dirty="0"/>
+              <a:t>The result is </a:t>
+            </a:r>
+            <a:r>
+              <a:rPr lang="en-US" sz="2800" dirty="0" smtClean="0"/>
+              <a:t>zero </a:t>
+            </a:r>
+            <a:r>
+              <a:rPr sz="2800" dirty="0" smtClean="0"/>
+              <a:t>or </a:t>
+            </a:r>
+            <a:r>
+              <a:rPr sz="2800" dirty="0"/>
+              <a:t>more RESOURCE </a:t>
+            </a:r>
+            <a:r>
+              <a:rPr sz="2800" dirty="0" smtClean="0"/>
+              <a:t>RECORD</a:t>
+            </a:r>
+            <a:r>
+              <a:rPr lang="en-US" sz="2800" dirty="0" smtClean="0"/>
+              <a:t> </a:t>
+            </a:r>
+            <a:r>
+              <a:rPr sz="2800" dirty="0" smtClean="0"/>
+              <a:t>S</a:t>
+            </a:r>
+            <a:r>
+              <a:rPr lang="en-US" sz="2800" dirty="0" smtClean="0"/>
+              <a:t>ETS</a:t>
+            </a:r>
+            <a:r>
+              <a:rPr sz="2800" dirty="0" smtClean="0"/>
+              <a:t> </a:t>
+            </a:r>
+            <a:r>
+              <a:rPr sz="2800" dirty="0"/>
+              <a:t>(</a:t>
+            </a:r>
+            <a:r>
+              <a:rPr sz="2800" dirty="0" smtClean="0"/>
+              <a:t>RR</a:t>
+            </a:r>
+            <a:r>
+              <a:rPr lang="en-US" sz="2800" dirty="0" smtClean="0"/>
+              <a:t>Set</a:t>
+            </a:r>
+            <a:r>
+              <a:rPr sz="2800" dirty="0" smtClean="0"/>
+              <a:t>s</a:t>
+            </a:r>
+            <a:r>
+              <a:rPr sz="2800" dirty="0"/>
+              <a:t>)</a:t>
             </a:r>
           </a:p>
           <a:p>
@@ -15636,8 +15941,24 @@
               <a:defRPr sz="1800"/>
             </a:pPr>
             <a:r>
-              <a:rPr sz="2800"/>
-              <a:t>There are different RRs for different types of information</a:t>
+              <a:rPr sz="2800" dirty="0"/>
+              <a:t>There are different </a:t>
+            </a:r>
+            <a:r>
+              <a:rPr sz="2800" dirty="0" smtClean="0"/>
+              <a:t>RR</a:t>
+            </a:r>
+            <a:r>
+              <a:rPr lang="en-US" sz="2800" dirty="0" smtClean="0"/>
+              <a:t>TYPEs</a:t>
+            </a:r>
+            <a:r>
+              <a:rPr sz="2800" dirty="0" smtClean="0"/>
+              <a:t> </a:t>
+            </a:r>
+            <a:r>
+              <a:rPr sz="2800" dirty="0"/>
+              <a:t>for different types of information</a:t>
             </a:r>
           </a:p>
           <a:p>
@@ -15674,7 +15995,7 @@
               <a:defRPr sz="1800"/>
             </a:pPr>
             <a:r>
-              <a:rPr sz="2800"/>
+              <a:rPr sz="2800" dirty="0"/>
               <a:t>You can ask for the specific type you want, or ask for "any" RRs associated with the domain name</a:t>
             </a:r>
           </a:p>

</xml_diff>